<commit_message>
adding work scheme to the slides
</commit_message>
<xml_diff>
--- a/Slides/devcon2014_ege.pptx
+++ b/Slides/devcon2014_ege.pptx
@@ -5,10 +5,10 @@
     <p:sldMasterId id="2147483648" r:id="rId4"/>
   </p:sldMasterIdLst>
   <p:notesMasterIdLst>
-    <p:notesMasterId r:id="rId28"/>
+    <p:notesMasterId r:id="rId29"/>
   </p:notesMasterIdLst>
   <p:handoutMasterIdLst>
-    <p:handoutMasterId r:id="rId29"/>
+    <p:handoutMasterId r:id="rId30"/>
   </p:handoutMasterIdLst>
   <p:sldIdLst>
     <p:sldId id="257" r:id="rId5"/>
@@ -18,22 +18,23 @@
     <p:sldId id="280" r:id="rId9"/>
     <p:sldId id="271" r:id="rId10"/>
     <p:sldId id="282" r:id="rId11"/>
-    <p:sldId id="283" r:id="rId12"/>
-    <p:sldId id="284" r:id="rId13"/>
-    <p:sldId id="285" r:id="rId14"/>
-    <p:sldId id="286" r:id="rId15"/>
-    <p:sldId id="287" r:id="rId16"/>
-    <p:sldId id="288" r:id="rId17"/>
-    <p:sldId id="290" r:id="rId18"/>
-    <p:sldId id="275" r:id="rId19"/>
-    <p:sldId id="291" r:id="rId20"/>
-    <p:sldId id="278" r:id="rId21"/>
-    <p:sldId id="292" r:id="rId22"/>
-    <p:sldId id="277" r:id="rId23"/>
-    <p:sldId id="293" r:id="rId24"/>
-    <p:sldId id="276" r:id="rId25"/>
-    <p:sldId id="267" r:id="rId26"/>
-    <p:sldId id="264" r:id="rId27"/>
+    <p:sldId id="294" r:id="rId12"/>
+    <p:sldId id="283" r:id="rId13"/>
+    <p:sldId id="284" r:id="rId14"/>
+    <p:sldId id="285" r:id="rId15"/>
+    <p:sldId id="286" r:id="rId16"/>
+    <p:sldId id="287" r:id="rId17"/>
+    <p:sldId id="288" r:id="rId18"/>
+    <p:sldId id="290" r:id="rId19"/>
+    <p:sldId id="275" r:id="rId20"/>
+    <p:sldId id="291" r:id="rId21"/>
+    <p:sldId id="278" r:id="rId22"/>
+    <p:sldId id="292" r:id="rId23"/>
+    <p:sldId id="277" r:id="rId24"/>
+    <p:sldId id="293" r:id="rId25"/>
+    <p:sldId id="276" r:id="rId26"/>
+    <p:sldId id="267" r:id="rId27"/>
+    <p:sldId id="264" r:id="rId28"/>
   </p:sldIdLst>
   <p:sldSz cx="12192000" cy="6858000"/>
   <p:notesSz cx="6858000" cy="9144000"/>
@@ -225,7 +226,7 @@
           <a:p>
             <a:fld id="{94239FBE-FC08-4336-9B53-CDE8BC5ED33D}" type="datetimeFigureOut">
               <a:rPr lang="ru-RU" smtClean="0"/>
-              <a:t>26.05.2014</a:t>
+              <a:t>27.05.2014</a:t>
             </a:fld>
             <a:endParaRPr lang="ru-RU"/>
           </a:p>
@@ -390,7 +391,7 @@
           <a:p>
             <a:fld id="{135EBF37-D0C5-4B7C-9D35-9D2E20CA27EC}" type="datetimeFigureOut">
               <a:rPr lang="ru-RU" smtClean="0"/>
-              <a:t>26.05.2014</a:t>
+              <a:t>27.05.2014</a:t>
             </a:fld>
             <a:endParaRPr lang="ru-RU"/>
           </a:p>
@@ -1079,7 +1080,7 @@
                   <a:spcPct val="0"/>
                 </a:spcAft>
               </a:pPr>
-              <a:t>5/26/2014 10:58 AM</a:t>
+              <a:t>5/27/2014 4:09 PM</a:t>
             </a:fld>
             <a:endParaRPr lang="en-US"/>
           </a:p>
@@ -1249,7 +1250,7 @@
                   <a:spcPct val="0"/>
                 </a:spcAft>
               </a:pPr>
-              <a:t>23</a:t>
+              <a:t>24</a:t>
             </a:fld>
             <a:endParaRPr lang="en-US"/>
           </a:p>
@@ -5618,12 +5619,12 @@
       </p:grpSpPr>
       <p:sp>
         <p:nvSpPr>
-          <p:cNvPr id="4" name="Title 3"/>
+          <p:cNvPr id="2" name="Title 1"/>
           <p:cNvSpPr>
             <a:spLocks noGrp="1"/>
           </p:cNvSpPr>
           <p:nvPr>
-            <p:ph type="ctrTitle"/>
+            <p:ph type="title"/>
           </p:nvPr>
         </p:nvSpPr>
         <p:spPr/>
@@ -5632,29 +5633,21 @@
           <a:lstStyle/>
           <a:p>
             <a:r>
-              <a:rPr lang="en-US" dirty="0"/>
-              <a:t>2</a:t>
-            </a:r>
-            <a:r>
-              <a:rPr lang="en-US" dirty="0" smtClean="0"/>
-              <a:t>. </a:t>
-            </a:r>
-            <a:r>
-              <a:rPr lang="ru-RU" dirty="0" smtClean="0"/>
-              <a:t>Опыт разработки</a:t>
-            </a:r>
-            <a:endParaRPr lang="ru-RU" dirty="0"/>
-          </a:p>
-        </p:txBody>
-      </p:sp>
-      <p:sp>
-        <p:nvSpPr>
-          <p:cNvPr id="5" name="Subtitle 4"/>
+              <a:rPr lang="ru-RU" dirty="0" smtClean="0"/>
+              <a:t>Архитектура сервиса</a:t>
+            </a:r>
+            <a:endParaRPr lang="en-US" dirty="0"/>
+          </a:p>
+        </p:txBody>
+      </p:sp>
+      <p:sp>
+        <p:nvSpPr>
+          <p:cNvPr id="3" name="Content Placeholder 2"/>
           <p:cNvSpPr>
             <a:spLocks noGrp="1"/>
           </p:cNvSpPr>
           <p:nvPr>
-            <p:ph type="subTitle" idx="1"/>
+            <p:ph idx="1"/>
           </p:nvPr>
         </p:nvSpPr>
         <p:spPr/>
@@ -5662,14 +5655,67 @@
           <a:bodyPr/>
           <a:lstStyle/>
           <a:p>
-            <a:endParaRPr lang="ru-RU"/>
+            <a:r>
+              <a:rPr lang="en-US" dirty="0" smtClean="0"/>
+              <a:t>Browser extension </a:t>
+            </a:r>
+            <a:r>
+              <a:rPr lang="ru-RU" dirty="0" smtClean="0"/>
+              <a:t>для сканирования и печати</a:t>
+            </a:r>
+            <a:endParaRPr lang="en-US" dirty="0" smtClean="0"/>
+          </a:p>
+          <a:p>
+            <a:r>
+              <a:rPr lang="en-US" dirty="0" smtClean="0"/>
+              <a:t>Azure Queue </a:t>
+            </a:r>
+            <a:r>
+              <a:rPr lang="ru-RU" dirty="0" smtClean="0"/>
+              <a:t>и </a:t>
+            </a:r>
+            <a:r>
+              <a:rPr lang="en-US" dirty="0" smtClean="0"/>
+              <a:t>Azure Worker Role </a:t>
+            </a:r>
+            <a:r>
+              <a:rPr lang="ru-RU" dirty="0" smtClean="0"/>
+              <a:t>для работы с распознаванием изображений</a:t>
+            </a:r>
+          </a:p>
+          <a:p>
+            <a:r>
+              <a:rPr lang="en-US" dirty="0" smtClean="0"/>
+              <a:t>ABBYY Cloud OCR SDK </a:t>
+            </a:r>
+            <a:r>
+              <a:rPr lang="ru-RU" dirty="0" smtClean="0"/>
+              <a:t>для распознавания</a:t>
+            </a:r>
+            <a:endParaRPr lang="en-US" dirty="0" smtClean="0"/>
+          </a:p>
+          <a:p>
+            <a:pPr lvl="1"/>
+            <a:r>
+              <a:rPr lang="en-US" dirty="0" smtClean="0">
+                <a:hlinkClick r:id="rId2"/>
+              </a:rPr>
+              <a:t>http</a:t>
+            </a:r>
+            <a:r>
+              <a:rPr lang="en-US" dirty="0">
+                <a:hlinkClick r:id="rId2"/>
+              </a:rPr>
+              <a:t>://ocrsdk.com/</a:t>
+            </a:r>
+            <a:endParaRPr lang="ru-RU" dirty="0" smtClean="0"/>
           </a:p>
         </p:txBody>
       </p:sp>
     </p:spTree>
     <p:extLst>
       <p:ext uri="{BB962C8B-B14F-4D97-AF65-F5344CB8AC3E}">
-        <p14:creationId xmlns:p14="http://schemas.microsoft.com/office/powerpoint/2010/main" val="2708893099"/>
+        <p14:creationId xmlns:p14="http://schemas.microsoft.com/office/powerpoint/2010/main" val="3643400134"/>
       </p:ext>
     </p:extLst>
   </p:cSld>
@@ -5705,12 +5751,12 @@
       </p:grpSpPr>
       <p:sp>
         <p:nvSpPr>
-          <p:cNvPr id="2" name="Title 1"/>
+          <p:cNvPr id="4" name="Title 3"/>
           <p:cNvSpPr>
             <a:spLocks noGrp="1"/>
           </p:cNvSpPr>
           <p:nvPr>
-            <p:ph type="title"/>
+            <p:ph type="ctrTitle"/>
           </p:nvPr>
         </p:nvSpPr>
         <p:spPr/>
@@ -5719,21 +5765,29 @@
           <a:lstStyle/>
           <a:p>
             <a:r>
-              <a:rPr lang="ru-RU" dirty="0" smtClean="0"/>
-              <a:t>Данные</a:t>
-            </a:r>
-            <a:endParaRPr lang="en-US" dirty="0"/>
-          </a:p>
-        </p:txBody>
-      </p:sp>
-      <p:sp>
-        <p:nvSpPr>
-          <p:cNvPr id="3" name="Content Placeholder 2"/>
+              <a:rPr lang="en-US" dirty="0"/>
+              <a:t>2</a:t>
+            </a:r>
+            <a:r>
+              <a:rPr lang="en-US" dirty="0" smtClean="0"/>
+              <a:t>. </a:t>
+            </a:r>
+            <a:r>
+              <a:rPr lang="ru-RU" dirty="0" smtClean="0"/>
+              <a:t>Опыт разработки</a:t>
+            </a:r>
+            <a:endParaRPr lang="ru-RU" dirty="0"/>
+          </a:p>
+        </p:txBody>
+      </p:sp>
+      <p:sp>
+        <p:nvSpPr>
+          <p:cNvPr id="5" name="Subtitle 4"/>
           <p:cNvSpPr>
             <a:spLocks noGrp="1"/>
           </p:cNvSpPr>
           <p:nvPr>
-            <p:ph idx="1"/>
+            <p:ph type="subTitle" idx="1"/>
           </p:nvPr>
         </p:nvSpPr>
         <p:spPr/>
@@ -5741,72 +5795,14 @@
           <a:bodyPr/>
           <a:lstStyle/>
           <a:p>
-            <a:r>
-              <a:rPr lang="ru-RU" dirty="0" smtClean="0"/>
-              <a:t>Мультитенантность</a:t>
-            </a:r>
-          </a:p>
-          <a:p>
-            <a:pPr lvl="1"/>
-            <a:r>
-              <a:rPr lang="ru-RU" dirty="0" smtClean="0"/>
-              <a:t>С</a:t>
-            </a:r>
-            <a:r>
-              <a:rPr lang="en-US" dirty="0" err="1" smtClean="0"/>
-              <a:t>onnection</a:t>
-            </a:r>
-            <a:r>
-              <a:rPr lang="en-US" dirty="0" smtClean="0"/>
-              <a:t> string per tenant</a:t>
-            </a:r>
-            <a:r>
-              <a:rPr lang="ru-RU" dirty="0" smtClean="0"/>
-              <a:t/>
-            </a:r>
-            <a:br>
-              <a:rPr lang="ru-RU" dirty="0" smtClean="0"/>
-            </a:br>
-            <a:r>
-              <a:rPr lang="ru-RU" dirty="0" smtClean="0"/>
-              <a:t>Глобально доступные данные</a:t>
-            </a:r>
-            <a:r>
-              <a:rPr lang="en-US" dirty="0"/>
-              <a:t> </a:t>
-            </a:r>
-            <a:r>
-              <a:rPr lang="ru-RU" dirty="0" smtClean="0"/>
-              <a:t>в </a:t>
-            </a:r>
-            <a:r>
-              <a:rPr lang="en-US" dirty="0" smtClean="0"/>
-              <a:t>Azure Table Storage</a:t>
-            </a:r>
-          </a:p>
-          <a:p>
-            <a:r>
-              <a:rPr lang="en-US" dirty="0" smtClean="0"/>
-              <a:t>Azure Blob storage </a:t>
-            </a:r>
-            <a:r>
-              <a:rPr lang="ru-RU" dirty="0" smtClean="0"/>
-              <a:t>для хранения файлов</a:t>
-            </a:r>
-          </a:p>
-          <a:p>
-            <a:pPr lvl="1"/>
-            <a:r>
-              <a:rPr lang="ru-RU" dirty="0" smtClean="0"/>
-              <a:t>Один контейнер или много контейнеров?</a:t>
-            </a:r>
+            <a:endParaRPr lang="ru-RU"/>
           </a:p>
         </p:txBody>
       </p:sp>
     </p:spTree>
     <p:extLst>
       <p:ext uri="{BB962C8B-B14F-4D97-AF65-F5344CB8AC3E}">
-        <p14:creationId xmlns:p14="http://schemas.microsoft.com/office/powerpoint/2010/main" val="3309134068"/>
+        <p14:creationId xmlns:p14="http://schemas.microsoft.com/office/powerpoint/2010/main" val="2708893099"/>
       </p:ext>
     </p:extLst>
   </p:cSld>
@@ -5856,6 +5852,143 @@
           <a:lstStyle/>
           <a:p>
             <a:r>
+              <a:rPr lang="ru-RU" dirty="0" smtClean="0"/>
+              <a:t>Данные</a:t>
+            </a:r>
+            <a:endParaRPr lang="en-US" dirty="0"/>
+          </a:p>
+        </p:txBody>
+      </p:sp>
+      <p:sp>
+        <p:nvSpPr>
+          <p:cNvPr id="3" name="Content Placeholder 2"/>
+          <p:cNvSpPr>
+            <a:spLocks noGrp="1"/>
+          </p:cNvSpPr>
+          <p:nvPr>
+            <p:ph idx="1"/>
+          </p:nvPr>
+        </p:nvSpPr>
+        <p:spPr/>
+        <p:txBody>
+          <a:bodyPr/>
+          <a:lstStyle/>
+          <a:p>
+            <a:r>
+              <a:rPr lang="ru-RU" dirty="0" smtClean="0"/>
+              <a:t>Мультитенантность</a:t>
+            </a:r>
+          </a:p>
+          <a:p>
+            <a:pPr lvl="1"/>
+            <a:r>
+              <a:rPr lang="ru-RU" dirty="0" smtClean="0"/>
+              <a:t>С</a:t>
+            </a:r>
+            <a:r>
+              <a:rPr lang="en-US" dirty="0" err="1" smtClean="0"/>
+              <a:t>onnection</a:t>
+            </a:r>
+            <a:r>
+              <a:rPr lang="en-US" dirty="0" smtClean="0"/>
+              <a:t> string per tenant</a:t>
+            </a:r>
+            <a:r>
+              <a:rPr lang="ru-RU" dirty="0" smtClean="0"/>
+              <a:t/>
+            </a:r>
+            <a:br>
+              <a:rPr lang="ru-RU" dirty="0" smtClean="0"/>
+            </a:br>
+            <a:r>
+              <a:rPr lang="ru-RU" dirty="0" smtClean="0"/>
+              <a:t>Глобально доступные данные</a:t>
+            </a:r>
+            <a:r>
+              <a:rPr lang="en-US" dirty="0"/>
+              <a:t> </a:t>
+            </a:r>
+            <a:r>
+              <a:rPr lang="ru-RU" dirty="0" smtClean="0"/>
+              <a:t>в </a:t>
+            </a:r>
+            <a:r>
+              <a:rPr lang="en-US" dirty="0" smtClean="0"/>
+              <a:t>Azure Table Storage</a:t>
+            </a:r>
+          </a:p>
+          <a:p>
+            <a:r>
+              <a:rPr lang="en-US" dirty="0" smtClean="0"/>
+              <a:t>Azure Blob storage </a:t>
+            </a:r>
+            <a:r>
+              <a:rPr lang="ru-RU" dirty="0" smtClean="0"/>
+              <a:t>для хранения файлов</a:t>
+            </a:r>
+          </a:p>
+          <a:p>
+            <a:pPr lvl="1"/>
+            <a:r>
+              <a:rPr lang="ru-RU" dirty="0" smtClean="0"/>
+              <a:t>Один контейнер или много контейнеров?</a:t>
+            </a:r>
+          </a:p>
+        </p:txBody>
+      </p:sp>
+    </p:spTree>
+    <p:extLst>
+      <p:ext uri="{BB962C8B-B14F-4D97-AF65-F5344CB8AC3E}">
+        <p14:creationId xmlns:p14="http://schemas.microsoft.com/office/powerpoint/2010/main" val="3309134068"/>
+      </p:ext>
+    </p:extLst>
+  </p:cSld>
+  <p:clrMapOvr>
+    <a:masterClrMapping/>
+  </p:clrMapOvr>
+  <p:timing>
+    <p:tnLst>
+      <p:par>
+        <p:cTn id="1" dur="indefinite" restart="never" nodeType="tmRoot"/>
+      </p:par>
+    </p:tnLst>
+  </p:timing>
+</p:sld>
+</file>
+
+<file path=ppt/slides/slide13.xml><?xml version="1.0" encoding="utf-8"?>
+<p:sld xmlns:a="http://schemas.openxmlformats.org/drawingml/2006/main" xmlns:r="http://schemas.openxmlformats.org/officeDocument/2006/relationships" xmlns:p="http://schemas.openxmlformats.org/presentationml/2006/main">
+  <p:cSld>
+    <p:spTree>
+      <p:nvGrpSpPr>
+        <p:cNvPr id="1" name=""/>
+        <p:cNvGrpSpPr/>
+        <p:nvPr/>
+      </p:nvGrpSpPr>
+      <p:grpSpPr>
+        <a:xfrm>
+          <a:off x="0" y="0"/>
+          <a:ext cx="0" cy="0"/>
+          <a:chOff x="0" y="0"/>
+          <a:chExt cx="0" cy="0"/>
+        </a:xfrm>
+      </p:grpSpPr>
+      <p:sp>
+        <p:nvSpPr>
+          <p:cNvPr id="2" name="Title 1"/>
+          <p:cNvSpPr>
+            <a:spLocks noGrp="1"/>
+          </p:cNvSpPr>
+          <p:nvPr>
+            <p:ph type="title"/>
+          </p:nvPr>
+        </p:nvSpPr>
+        <p:spPr/>
+        <p:txBody>
+          <a:bodyPr/>
+          <a:lstStyle/>
+          <a:p>
+            <a:r>
               <a:rPr lang="en-US" dirty="0" smtClean="0"/>
               <a:t>Backend</a:t>
             </a:r>
@@ -5994,7 +6127,7 @@
 </p:sld>
 </file>
 
-<file path=ppt/slides/slide13.xml><?xml version="1.0" encoding="utf-8"?>
+<file path=ppt/slides/slide14.xml><?xml version="1.0" encoding="utf-8"?>
 <p:sld xmlns:a="http://schemas.openxmlformats.org/drawingml/2006/main" xmlns:r="http://schemas.openxmlformats.org/officeDocument/2006/relationships" xmlns:p="http://schemas.openxmlformats.org/presentationml/2006/main">
   <p:cSld>
     <p:spTree>
@@ -6094,7 +6227,7 @@
 </p:sld>
 </file>
 
-<file path=ppt/slides/slide14.xml><?xml version="1.0" encoding="utf-8"?>
+<file path=ppt/slides/slide15.xml><?xml version="1.0" encoding="utf-8"?>
 <p:sld xmlns:a="http://schemas.openxmlformats.org/drawingml/2006/main" xmlns:r="http://schemas.openxmlformats.org/officeDocument/2006/relationships" xmlns:p="http://schemas.openxmlformats.org/presentationml/2006/main">
   <p:cSld>
     <p:spTree>
@@ -6231,7 +6364,7 @@
 </p:sld>
 </file>
 
-<file path=ppt/slides/slide15.xml><?xml version="1.0" encoding="utf-8"?>
+<file path=ppt/slides/slide16.xml><?xml version="1.0" encoding="utf-8"?>
 <p:sld xmlns:a="http://schemas.openxmlformats.org/drawingml/2006/main" xmlns:r="http://schemas.openxmlformats.org/officeDocument/2006/relationships" xmlns:p="http://schemas.openxmlformats.org/presentationml/2006/main">
   <p:cSld>
     <p:spTree>
@@ -6330,7 +6463,7 @@
 </p:sld>
 </file>
 
-<file path=ppt/slides/slide16.xml><?xml version="1.0" encoding="utf-8"?>
+<file path=ppt/slides/slide17.xml><?xml version="1.0" encoding="utf-8"?>
 <p:sld xmlns:a="http://schemas.openxmlformats.org/drawingml/2006/main" xmlns:r="http://schemas.openxmlformats.org/officeDocument/2006/relationships" xmlns:p="http://schemas.openxmlformats.org/presentationml/2006/main">
   <p:cSld>
     <p:spTree>
@@ -6500,7 +6633,7 @@
 </p:sld>
 </file>
 
-<file path=ppt/slides/slide17.xml><?xml version="1.0" encoding="utf-8"?>
+<file path=ppt/slides/slide18.xml><?xml version="1.0" encoding="utf-8"?>
 <p:sld xmlns:a="http://schemas.openxmlformats.org/drawingml/2006/main" xmlns:r="http://schemas.openxmlformats.org/officeDocument/2006/relationships" xmlns:p="http://schemas.openxmlformats.org/presentationml/2006/main">
   <p:cSld>
     <p:spTree>
@@ -6598,7 +6731,7 @@
 </p:sld>
 </file>
 
-<file path=ppt/slides/slide18.xml><?xml version="1.0" encoding="utf-8"?>
+<file path=ppt/slides/slide19.xml><?xml version="1.0" encoding="utf-8"?>
 <p:sld xmlns:a="http://schemas.openxmlformats.org/drawingml/2006/main" xmlns:r="http://schemas.openxmlformats.org/officeDocument/2006/relationships" xmlns:p="http://schemas.openxmlformats.org/presentationml/2006/main">
   <p:cSld>
     <p:spTree>
@@ -6718,7 +6851,121 @@
 </p:sld>
 </file>
 
-<file path=ppt/slides/slide19.xml><?xml version="1.0" encoding="utf-8"?>
+<file path=ppt/slides/slide2.xml><?xml version="1.0" encoding="utf-8"?>
+<p:sld xmlns:a="http://schemas.openxmlformats.org/drawingml/2006/main" xmlns:r="http://schemas.openxmlformats.org/officeDocument/2006/relationships" xmlns:p="http://schemas.openxmlformats.org/presentationml/2006/main">
+  <p:cSld>
+    <p:spTree>
+      <p:nvGrpSpPr>
+        <p:cNvPr id="1" name=""/>
+        <p:cNvGrpSpPr/>
+        <p:nvPr/>
+      </p:nvGrpSpPr>
+      <p:grpSpPr>
+        <a:xfrm>
+          <a:off x="0" y="0"/>
+          <a:ext cx="0" cy="0"/>
+          <a:chOff x="0" y="0"/>
+          <a:chExt cx="0" cy="0"/>
+        </a:xfrm>
+      </p:grpSpPr>
+      <p:sp>
+        <p:nvSpPr>
+          <p:cNvPr id="2" name="Title 1"/>
+          <p:cNvSpPr>
+            <a:spLocks noGrp="1"/>
+          </p:cNvSpPr>
+          <p:nvPr>
+            <p:ph type="ctrTitle"/>
+          </p:nvPr>
+        </p:nvSpPr>
+        <p:spPr/>
+        <p:txBody>
+          <a:bodyPr>
+            <a:normAutofit fontScale="90000"/>
+          </a:bodyPr>
+          <a:lstStyle/>
+          <a:p>
+            <a:r>
+              <a:rPr lang="ru-RU" dirty="0"/>
+              <a:t>Опыт разработки сервиса мониторинга подготовки к ЕГЭ </a:t>
+            </a:r>
+            <a:r>
+              <a:rPr lang="ru-RU" dirty="0" smtClean="0"/>
+              <a:t>на платформе </a:t>
+            </a:r>
+            <a:r>
+              <a:rPr lang="ru-RU" dirty="0"/>
+              <a:t>Microsoft </a:t>
+            </a:r>
+            <a:r>
+              <a:rPr lang="ru-RU" dirty="0" smtClean="0"/>
+              <a:t>Azure</a:t>
+            </a:r>
+            <a:endParaRPr lang="en-US" dirty="0"/>
+          </a:p>
+        </p:txBody>
+      </p:sp>
+      <p:sp>
+        <p:nvSpPr>
+          <p:cNvPr id="3" name="Text Placeholder 2"/>
+          <p:cNvSpPr>
+            <a:spLocks noGrp="1"/>
+          </p:cNvSpPr>
+          <p:nvPr>
+            <p:ph type="body" sz="quarter" idx="11"/>
+          </p:nvPr>
+        </p:nvSpPr>
+        <p:spPr/>
+        <p:txBody>
+          <a:bodyPr>
+            <a:normAutofit fontScale="85000" lnSpcReduction="10000"/>
+          </a:bodyPr>
+          <a:lstStyle/>
+          <a:p>
+            <a:pPr lvl="0"/>
+            <a:r>
+              <a:rPr lang="ru-RU" dirty="0" smtClean="0"/>
+              <a:t>Евгений Агафонов</a:t>
+            </a:r>
+            <a:r>
+              <a:rPr lang="en-US" dirty="0" smtClean="0"/>
+              <a:t> </a:t>
+            </a:r>
+            <a:r>
+              <a:rPr lang="en-US" sz="2400" dirty="0" smtClean="0"/>
+              <a:t>{</a:t>
+            </a:r>
+            <a:r>
+              <a:rPr lang="en-US" sz="2400" dirty="0"/>
+              <a:t>ABBYY, Head of Education Products Development Group}</a:t>
+            </a:r>
+          </a:p>
+          <a:p>
+            <a:endParaRPr lang="en-US" dirty="0"/>
+          </a:p>
+        </p:txBody>
+      </p:sp>
+    </p:spTree>
+    <p:extLst>
+      <p:ext uri="{BB962C8B-B14F-4D97-AF65-F5344CB8AC3E}">
+        <p14:creationId xmlns:p14="http://schemas.microsoft.com/office/powerpoint/2010/main" val="2899047879"/>
+      </p:ext>
+    </p:extLst>
+  </p:cSld>
+  <p:clrMapOvr>
+    <a:masterClrMapping/>
+  </p:clrMapOvr>
+  <p:timing>
+    <p:tnLst>
+      <p:par>
+        <p:cTn id="1" dur="indefinite" restart="never" nodeType="tmRoot"/>
+      </p:par>
+    </p:tnLst>
+  </p:timing>
+</p:sld>
+</file>
+
+<file path=ppt/slides/slide20.xml><?xml version="1.0" encoding="utf-8"?>
 <p:sld xmlns:a="http://schemas.openxmlformats.org/drawingml/2006/main" xmlns:r="http://schemas.openxmlformats.org/officeDocument/2006/relationships" xmlns:p="http://schemas.openxmlformats.org/presentationml/2006/main">
   <p:cSld>
     <p:spTree>
@@ -6810,121 +7057,7 @@
 </p:sld>
 </file>
 
-<file path=ppt/slides/slide2.xml><?xml version="1.0" encoding="utf-8"?>
-<p:sld xmlns:a="http://schemas.openxmlformats.org/drawingml/2006/main" xmlns:r="http://schemas.openxmlformats.org/officeDocument/2006/relationships" xmlns:p="http://schemas.openxmlformats.org/presentationml/2006/main">
-  <p:cSld>
-    <p:spTree>
-      <p:nvGrpSpPr>
-        <p:cNvPr id="1" name=""/>
-        <p:cNvGrpSpPr/>
-        <p:nvPr/>
-      </p:nvGrpSpPr>
-      <p:grpSpPr>
-        <a:xfrm>
-          <a:off x="0" y="0"/>
-          <a:ext cx="0" cy="0"/>
-          <a:chOff x="0" y="0"/>
-          <a:chExt cx="0" cy="0"/>
-        </a:xfrm>
-      </p:grpSpPr>
-      <p:sp>
-        <p:nvSpPr>
-          <p:cNvPr id="2" name="Title 1"/>
-          <p:cNvSpPr>
-            <a:spLocks noGrp="1"/>
-          </p:cNvSpPr>
-          <p:nvPr>
-            <p:ph type="ctrTitle"/>
-          </p:nvPr>
-        </p:nvSpPr>
-        <p:spPr/>
-        <p:txBody>
-          <a:bodyPr>
-            <a:normAutofit fontScale="90000"/>
-          </a:bodyPr>
-          <a:lstStyle/>
-          <a:p>
-            <a:r>
-              <a:rPr lang="ru-RU" dirty="0"/>
-              <a:t>Опыт разработки сервиса мониторинга подготовки к ЕГЭ </a:t>
-            </a:r>
-            <a:r>
-              <a:rPr lang="ru-RU" dirty="0" smtClean="0"/>
-              <a:t>на платформе </a:t>
-            </a:r>
-            <a:r>
-              <a:rPr lang="ru-RU" dirty="0"/>
-              <a:t>Microsoft </a:t>
-            </a:r>
-            <a:r>
-              <a:rPr lang="ru-RU" dirty="0" smtClean="0"/>
-              <a:t>Azure</a:t>
-            </a:r>
-            <a:endParaRPr lang="en-US" dirty="0"/>
-          </a:p>
-        </p:txBody>
-      </p:sp>
-      <p:sp>
-        <p:nvSpPr>
-          <p:cNvPr id="3" name="Text Placeholder 2"/>
-          <p:cNvSpPr>
-            <a:spLocks noGrp="1"/>
-          </p:cNvSpPr>
-          <p:nvPr>
-            <p:ph type="body" sz="quarter" idx="11"/>
-          </p:nvPr>
-        </p:nvSpPr>
-        <p:spPr/>
-        <p:txBody>
-          <a:bodyPr>
-            <a:normAutofit fontScale="85000" lnSpcReduction="10000"/>
-          </a:bodyPr>
-          <a:lstStyle/>
-          <a:p>
-            <a:pPr lvl="0"/>
-            <a:r>
-              <a:rPr lang="ru-RU" dirty="0" smtClean="0"/>
-              <a:t>Евгений Агафонов</a:t>
-            </a:r>
-            <a:r>
-              <a:rPr lang="en-US" dirty="0" smtClean="0"/>
-              <a:t> </a:t>
-            </a:r>
-            <a:r>
-              <a:rPr lang="en-US" sz="2400" dirty="0" smtClean="0"/>
-              <a:t>{</a:t>
-            </a:r>
-            <a:r>
-              <a:rPr lang="en-US" sz="2400" dirty="0"/>
-              <a:t>ABBYY, Head of Education Products Development Group}</a:t>
-            </a:r>
-          </a:p>
-          <a:p>
-            <a:endParaRPr lang="en-US" dirty="0"/>
-          </a:p>
-        </p:txBody>
-      </p:sp>
-    </p:spTree>
-    <p:extLst>
-      <p:ext uri="{BB962C8B-B14F-4D97-AF65-F5344CB8AC3E}">
-        <p14:creationId xmlns:p14="http://schemas.microsoft.com/office/powerpoint/2010/main" val="2899047879"/>
-      </p:ext>
-    </p:extLst>
-  </p:cSld>
-  <p:clrMapOvr>
-    <a:masterClrMapping/>
-  </p:clrMapOvr>
-  <p:timing>
-    <p:tnLst>
-      <p:par>
-        <p:cTn id="1" dur="indefinite" restart="never" nodeType="tmRoot"/>
-      </p:par>
-    </p:tnLst>
-  </p:timing>
-</p:sld>
-</file>
-
-<file path=ppt/slides/slide20.xml><?xml version="1.0" encoding="utf-8"?>
+<file path=ppt/slides/slide21.xml><?xml version="1.0" encoding="utf-8"?>
 <p:sld xmlns:a="http://schemas.openxmlformats.org/drawingml/2006/main" xmlns:r="http://schemas.openxmlformats.org/officeDocument/2006/relationships" xmlns:p="http://schemas.openxmlformats.org/presentationml/2006/main">
   <p:cSld>
     <p:spTree>
@@ -7144,7 +7277,7 @@
 </p:sld>
 </file>
 
-<file path=ppt/slides/slide21.xml><?xml version="1.0" encoding="utf-8"?>
+<file path=ppt/slides/slide22.xml><?xml version="1.0" encoding="utf-8"?>
 <p:sld xmlns:a="http://schemas.openxmlformats.org/drawingml/2006/main" xmlns:r="http://schemas.openxmlformats.org/officeDocument/2006/relationships" xmlns:p="http://schemas.openxmlformats.org/presentationml/2006/main">
   <p:cSld>
     <p:spTree>
@@ -7239,7 +7372,7 @@
 </p:sld>
 </file>
 
-<file path=ppt/slides/slide22.xml><?xml version="1.0" encoding="utf-8"?>
+<file path=ppt/slides/slide23.xml><?xml version="1.0" encoding="utf-8"?>
 <p:sld xmlns:a="http://schemas.openxmlformats.org/drawingml/2006/main" xmlns:r="http://schemas.openxmlformats.org/officeDocument/2006/relationships" xmlns:p="http://schemas.openxmlformats.org/presentationml/2006/main">
   <p:cSld>
     <p:spTree>
@@ -7401,7 +7534,7 @@
 </p:sld>
 </file>
 
-<file path=ppt/slides/slide23.xml><?xml version="1.0" encoding="utf-8"?>
+<file path=ppt/slides/slide24.xml><?xml version="1.0" encoding="utf-8"?>
 <p:sld xmlns:a="http://schemas.openxmlformats.org/drawingml/2006/main" xmlns:r="http://schemas.openxmlformats.org/officeDocument/2006/relationships" xmlns:p="http://schemas.openxmlformats.org/presentationml/2006/main">
   <p:cSld>
     <p:spTree>
@@ -8132,9 +8265,9 @@
           <a:p>
             <a:r>
               <a:rPr lang="ru-RU" dirty="0" smtClean="0"/>
-              <a:t>Архитектура сервиса</a:t>
-            </a:r>
-            <a:endParaRPr lang="en-US" dirty="0"/>
+              <a:t>Как работает сервис</a:t>
+            </a:r>
+            <a:endParaRPr lang="en-GB" dirty="0"/>
           </a:p>
         </p:txBody>
       </p:sp>
@@ -8150,69 +8283,90 @@
         </p:nvSpPr>
         <p:spPr/>
         <p:txBody>
-          <a:bodyPr/>
+          <a:bodyPr>
+            <a:normAutofit/>
+          </a:bodyPr>
           <a:lstStyle/>
           <a:p>
-            <a:r>
-              <a:rPr lang="en-US" dirty="0" err="1" smtClean="0"/>
-              <a:t>RESTful</a:t>
-            </a:r>
-            <a:r>
-              <a:rPr lang="en-US" dirty="0" smtClean="0"/>
-              <a:t> API + HTML5 client</a:t>
-            </a:r>
-          </a:p>
-          <a:p>
-            <a:r>
-              <a:rPr lang="en-US" dirty="0" smtClean="0"/>
-              <a:t>Azure Cache </a:t>
-            </a:r>
-            <a:r>
-              <a:rPr lang="ru-RU" dirty="0" smtClean="0"/>
-              <a:t>для часто требующихся данных</a:t>
-            </a:r>
-          </a:p>
-          <a:p>
-            <a:r>
-              <a:rPr lang="en-US" dirty="0" smtClean="0"/>
-              <a:t>Azure Blob storage </a:t>
-            </a:r>
-            <a:r>
-              <a:rPr lang="ru-RU" dirty="0" smtClean="0"/>
-              <a:t>для хранения изображений и контента</a:t>
-            </a:r>
-          </a:p>
-          <a:p>
-            <a:r>
-              <a:rPr lang="en-US" dirty="0" smtClean="0"/>
-              <a:t>Azure Table storage </a:t>
-            </a:r>
-            <a:r>
-              <a:rPr lang="ru-RU" dirty="0" smtClean="0"/>
-              <a:t>для хранения глобальных данных</a:t>
-            </a:r>
-          </a:p>
-          <a:p>
-            <a:r>
-              <a:rPr lang="en-US" dirty="0" smtClean="0"/>
-              <a:t>SQL Azure </a:t>
-            </a:r>
-            <a:r>
-              <a:rPr lang="ru-RU" dirty="0" smtClean="0"/>
-              <a:t>для хранения данных </a:t>
-            </a:r>
-            <a:r>
-              <a:rPr lang="en-US" dirty="0" smtClean="0"/>
-              <a:t>per tenant</a:t>
-            </a:r>
+            <a:endParaRPr lang="ru-RU" dirty="0"/>
+          </a:p>
+          <a:p>
             <a:endParaRPr lang="ru-RU" dirty="0" smtClean="0"/>
           </a:p>
-        </p:txBody>
-      </p:sp>
+          <a:p>
+            <a:endParaRPr lang="ru-RU" dirty="0"/>
+          </a:p>
+          <a:p>
+            <a:pPr lvl="1"/>
+            <a:r>
+              <a:rPr lang="ru-RU" dirty="0"/>
+              <a:t/>
+            </a:r>
+            <a:br>
+              <a:rPr lang="ru-RU" dirty="0"/>
+            </a:br>
+            <a:endParaRPr lang="en-GB" dirty="0"/>
+          </a:p>
+        </p:txBody>
+      </p:sp>
+      <p:pic>
+        <p:nvPicPr>
+          <p:cNvPr id="4" name="Picture 2"/>
+          <p:cNvPicPr>
+            <a:picLocks noChangeAspect="1" noChangeArrowheads="1"/>
+          </p:cNvPicPr>
+          <p:nvPr/>
+        </p:nvPicPr>
+        <p:blipFill>
+          <a:blip r:embed="rId2">
+            <a:extLst>
+              <a:ext uri="{28A0092B-C50C-407E-A947-70E740481C1C}">
+                <a14:useLocalDpi xmlns:a14="http://schemas.microsoft.com/office/drawing/2010/main" val="0"/>
+              </a:ext>
+            </a:extLst>
+          </a:blip>
+          <a:srcRect/>
+          <a:stretch>
+            <a:fillRect/>
+          </a:stretch>
+        </p:blipFill>
+        <p:spPr bwMode="auto">
+          <a:xfrm>
+            <a:off x="1101059" y="1449000"/>
+            <a:ext cx="10472189" cy="2520000"/>
+          </a:xfrm>
+          <a:prstGeom prst="rect">
+            <a:avLst/>
+          </a:prstGeom>
+          <a:noFill/>
+          <a:ln>
+            <a:noFill/>
+          </a:ln>
+          <a:extLst>
+            <a:ext uri="{909E8E84-426E-40DD-AFC4-6F175D3DCCD1}">
+              <a14:hiddenFill xmlns:a14="http://schemas.microsoft.com/office/drawing/2010/main">
+                <a:solidFill>
+                  <a:schemeClr val="accent1"/>
+                </a:solidFill>
+              </a14:hiddenFill>
+            </a:ext>
+            <a:ext uri="{91240B29-F687-4F45-9708-019B960494DF}">
+              <a14:hiddenLine xmlns:a14="http://schemas.microsoft.com/office/drawing/2010/main" w="9525">
+                <a:solidFill>
+                  <a:schemeClr val="tx1"/>
+                </a:solidFill>
+                <a:miter lim="800000"/>
+                <a:headEnd/>
+                <a:tailEnd/>
+              </a14:hiddenLine>
+            </a:ext>
+          </a:extLst>
+        </p:spPr>
+      </p:pic>
     </p:spTree>
     <p:extLst>
       <p:ext uri="{BB962C8B-B14F-4D97-AF65-F5344CB8AC3E}">
-        <p14:creationId xmlns:p14="http://schemas.microsoft.com/office/powerpoint/2010/main" val="2499349514"/>
+        <p14:creationId xmlns:p14="http://schemas.microsoft.com/office/powerpoint/2010/main" val="2720004118"/>
       </p:ext>
     </p:extLst>
   </p:cSld>
@@ -8285,57 +8439,56 @@
           <a:lstStyle/>
           <a:p>
             <a:r>
+              <a:rPr lang="en-US" dirty="0" err="1" smtClean="0"/>
+              <a:t>RESTful</a:t>
+            </a:r>
+            <a:r>
               <a:rPr lang="en-US" dirty="0" smtClean="0"/>
-              <a:t>Browser extension </a:t>
-            </a:r>
-            <a:r>
-              <a:rPr lang="ru-RU" dirty="0" smtClean="0"/>
-              <a:t>для сканирования и печати</a:t>
-            </a:r>
-            <a:endParaRPr lang="en-US" dirty="0" smtClean="0"/>
+              <a:t> API + HTML5 client</a:t>
+            </a:r>
           </a:p>
           <a:p>
             <a:r>
               <a:rPr lang="en-US" dirty="0" smtClean="0"/>
-              <a:t>Azure Queue </a:t>
-            </a:r>
-            <a:r>
-              <a:rPr lang="ru-RU" dirty="0" smtClean="0"/>
-              <a:t>и </a:t>
-            </a:r>
+              <a:t>Azure Cache </a:t>
+            </a:r>
+            <a:r>
+              <a:rPr lang="ru-RU" dirty="0" smtClean="0"/>
+              <a:t>для часто требующихся данных</a:t>
+            </a:r>
+          </a:p>
+          <a:p>
             <a:r>
               <a:rPr lang="en-US" dirty="0" smtClean="0"/>
-              <a:t>Azure Worker Role </a:t>
-            </a:r>
-            <a:r>
-              <a:rPr lang="ru-RU" dirty="0" smtClean="0"/>
-              <a:t>для работы с распознаванием изображений</a:t>
+              <a:t>Azure Blob storage </a:t>
+            </a:r>
+            <a:r>
+              <a:rPr lang="ru-RU" dirty="0" smtClean="0"/>
+              <a:t>для хранения изображений и контента</a:t>
             </a:r>
           </a:p>
           <a:p>
             <a:r>
               <a:rPr lang="en-US" dirty="0" smtClean="0"/>
-              <a:t>ABBYY Cloud OCR SDK </a:t>
-            </a:r>
-            <a:r>
-              <a:rPr lang="ru-RU" dirty="0" smtClean="0"/>
-              <a:t>для распознавания</a:t>
-            </a:r>
-            <a:endParaRPr lang="en-US" dirty="0" smtClean="0"/>
-          </a:p>
-          <a:p>
-            <a:pPr lvl="1"/>
-            <a:r>
-              <a:rPr lang="en-US" dirty="0" smtClean="0">
-                <a:hlinkClick r:id="rId2"/>
-              </a:rPr>
-              <a:t>http</a:t>
-            </a:r>
-            <a:r>
-              <a:rPr lang="en-US" dirty="0">
-                <a:hlinkClick r:id="rId2"/>
-              </a:rPr>
-              <a:t>://ocrsdk.com/</a:t>
+              <a:t>Azure Table storage </a:t>
+            </a:r>
+            <a:r>
+              <a:rPr lang="ru-RU" dirty="0" smtClean="0"/>
+              <a:t>для хранения глобальных данных</a:t>
+            </a:r>
+          </a:p>
+          <a:p>
+            <a:r>
+              <a:rPr lang="en-US" dirty="0" smtClean="0"/>
+              <a:t>SQL Azure </a:t>
+            </a:r>
+            <a:r>
+              <a:rPr lang="ru-RU" dirty="0" smtClean="0"/>
+              <a:t>для хранения данных </a:t>
+            </a:r>
+            <a:r>
+              <a:rPr lang="en-US" dirty="0" smtClean="0"/>
+              <a:t>per tenant</a:t>
             </a:r>
             <a:endParaRPr lang="ru-RU" dirty="0" smtClean="0"/>
           </a:p>
@@ -8344,7 +8497,7 @@
     </p:spTree>
     <p:extLst>
       <p:ext uri="{BB962C8B-B14F-4D97-AF65-F5344CB8AC3E}">
-        <p14:creationId xmlns:p14="http://schemas.microsoft.com/office/powerpoint/2010/main" val="3643400134"/>
+        <p14:creationId xmlns:p14="http://schemas.microsoft.com/office/powerpoint/2010/main" val="2499349514"/>
       </p:ext>
     </p:extLst>
   </p:cSld>
@@ -9091,15 +9244,6 @@
 </file>
 
 <file path=customXml/item2.xml><?xml version="1.0" encoding="utf-8"?>
-<?mso-contentType ?>
-<FormTemplates xmlns="http://schemas.microsoft.com/sharepoint/v3/contenttype/forms">
-  <Display>DocumentLibraryForm</Display>
-  <Edit>DocumentLibraryForm</Edit>
-  <New>DocumentLibraryForm</New>
-</FormTemplates>
-</file>
-
-<file path=customXml/item3.xml><?xml version="1.0" encoding="utf-8"?>
 <ct:contentTypeSchema xmlns:ct="http://schemas.microsoft.com/office/2006/metadata/contentType" xmlns:ma="http://schemas.microsoft.com/office/2006/metadata/properties/metaAttributes" ct:_="" ma:_="" ma:contentTypeName="Document" ma:contentTypeID="0x01010076BDC9AB8D85574E92B3FF85DD8EEE9A" ma:contentTypeVersion="1" ma:contentTypeDescription="Create a new document." ma:contentTypeScope="" ma:versionID="2e72a6d13f881d5d5061dda7c6af8501">
   <xsd:schema xmlns:xsd="http://www.w3.org/2001/XMLSchema" xmlns:xs="http://www.w3.org/2001/XMLSchema" xmlns:p="http://schemas.microsoft.com/office/2006/metadata/properties" xmlns:ns3="83163233-208f-487d-8d66-a814ca9ada95" targetNamespace="http://schemas.microsoft.com/office/2006/metadata/properties" ma:root="true" ma:fieldsID="341279c777b4549f0fa603bc1f710ef4" ns3:_="">
     <xsd:import namespace="83163233-208f-487d-8d66-a814ca9ada95"/>
@@ -9239,6 +9383,15 @@
 </ct:contentTypeSchema>
 </file>
 
+<file path=customXml/item3.xml><?xml version="1.0" encoding="utf-8"?>
+<?mso-contentType ?>
+<FormTemplates xmlns="http://schemas.microsoft.com/sharepoint/v3/contenttype/forms">
+  <Display>DocumentLibraryForm</Display>
+  <Edit>DocumentLibraryForm</Edit>
+  <New>DocumentLibraryForm</New>
+</FormTemplates>
+</file>
+
 <file path=customXml/itemProps1.xml><?xml version="1.0" encoding="utf-8"?>
 <ds:datastoreItem xmlns:ds="http://schemas.openxmlformats.org/officeDocument/2006/customXml" ds:itemID="{A5A1518E-3F6D-4166-8FC6-37AEE79B374E}">
   <ds:schemaRefs>
@@ -9256,14 +9409,6 @@
 </file>
 
 <file path=customXml/itemProps2.xml><?xml version="1.0" encoding="utf-8"?>
-<ds:datastoreItem xmlns:ds="http://schemas.openxmlformats.org/officeDocument/2006/customXml" ds:itemID="{AE2C73D0-6452-4B74-876E-F854C149D3F2}">
-  <ds:schemaRefs>
-    <ds:schemaRef ds:uri="http://schemas.microsoft.com/sharepoint/v3/contenttype/forms"/>
-  </ds:schemaRefs>
-</ds:datastoreItem>
-</file>
-
-<file path=customXml/itemProps3.xml><?xml version="1.0" encoding="utf-8"?>
 <ds:datastoreItem xmlns:ds="http://schemas.openxmlformats.org/officeDocument/2006/customXml" ds:itemID="{109FDA8F-394E-4FE5-9E2E-6A2A0BC6C38F}">
   <ds:schemaRefs>
     <ds:schemaRef ds:uri="http://schemas.microsoft.com/office/2006/metadata/contentType"/>
@@ -9279,4 +9424,12 @@
     <ds:schemaRef ds:uri="http://schemas.microsoft.com/internal/obd"/>
   </ds:schemaRefs>
 </ds:datastoreItem>
+</file>
+
+<file path=customXml/itemProps3.xml><?xml version="1.0" encoding="utf-8"?>
+<ds:datastoreItem xmlns:ds="http://schemas.openxmlformats.org/officeDocument/2006/customXml" ds:itemID="{AE2C73D0-6452-4B74-876E-F854C149D3F2}">
+  <ds:schemaRefs>
+    <ds:schemaRef ds:uri="http://schemas.microsoft.com/sharepoint/v3/contenttype/forms"/>
+  </ds:schemaRefs>
+</ds:datastoreItem>
 </file>
</xml_diff>